<commit_message>
Figures added to classification
</commit_message>
<xml_diff>
--- a/Second-Article/graphics/Figures.pptx
+++ b/Second-Article/graphics/Figures.pptx
@@ -5383,7 +5383,7 @@
         <p:spPr>
           <a:xfrm>
             <a:off x="1777285" y="4352120"/>
-            <a:ext cx="5499278" cy="0"/>
+            <a:ext cx="5321347" cy="0"/>
           </a:xfrm>
           <a:prstGeom prst="straightConnector1">
             <a:avLst/>
@@ -5418,7 +5418,7 @@
         </p:nvSpPr>
         <p:spPr>
           <a:xfrm>
-            <a:off x="7218431" y="4149008"/>
+            <a:off x="7037953" y="4149008"/>
             <a:ext cx="649537" cy="369332"/>
           </a:xfrm>
           <a:prstGeom prst="rect">
@@ -5471,41 +5471,6 @@
           </a:fontRef>
         </p:style>
       </p:cxnSp>
-      <p:cxnSp>
-        <p:nvCxnSpPr>
-          <p:cNvPr id="43" name="Straight Connector 42"/>
-          <p:cNvCxnSpPr/>
-          <p:nvPr/>
-        </p:nvCxnSpPr>
-        <p:spPr>
-          <a:xfrm>
-            <a:off x="4793696" y="3823214"/>
-            <a:ext cx="0" cy="527050"/>
-          </a:xfrm>
-          <a:prstGeom prst="line">
-            <a:avLst/>
-          </a:prstGeom>
-          <a:ln w="28575">
-            <a:solidFill>
-              <a:srgbClr val="C00000"/>
-            </a:solidFill>
-          </a:ln>
-        </p:spPr>
-        <p:style>
-          <a:lnRef idx="1">
-            <a:schemeClr val="accent1"/>
-          </a:lnRef>
-          <a:fillRef idx="0">
-            <a:schemeClr val="accent1"/>
-          </a:fillRef>
-          <a:effectRef idx="0">
-            <a:schemeClr val="accent1"/>
-          </a:effectRef>
-          <a:fontRef idx="minor">
-            <a:schemeClr val="tx1"/>
-          </a:fontRef>
-        </p:style>
-      </p:cxnSp>
       <p:sp>
         <p:nvSpPr>
           <p:cNvPr id="44" name="Rectangle 43"/>
@@ -5555,41 +5520,6 @@
           </a:p>
         </p:txBody>
       </p:sp>
-      <p:cxnSp>
-        <p:nvCxnSpPr>
-          <p:cNvPr id="45" name="Straight Connector 44"/>
-          <p:cNvCxnSpPr/>
-          <p:nvPr/>
-        </p:nvCxnSpPr>
-        <p:spPr>
-          <a:xfrm>
-            <a:off x="6355931" y="3825070"/>
-            <a:ext cx="0" cy="527050"/>
-          </a:xfrm>
-          <a:prstGeom prst="line">
-            <a:avLst/>
-          </a:prstGeom>
-          <a:ln w="28575">
-            <a:solidFill>
-              <a:srgbClr val="C00000"/>
-            </a:solidFill>
-          </a:ln>
-        </p:spPr>
-        <p:style>
-          <a:lnRef idx="1">
-            <a:schemeClr val="accent1"/>
-          </a:lnRef>
-          <a:fillRef idx="0">
-            <a:schemeClr val="accent1"/>
-          </a:fillRef>
-          <a:effectRef idx="0">
-            <a:schemeClr val="accent1"/>
-          </a:effectRef>
-          <a:fontRef idx="minor">
-            <a:schemeClr val="tx1"/>
-          </a:fontRef>
-        </p:style>
-      </p:cxnSp>
       <p:sp>
         <p:nvSpPr>
           <p:cNvPr id="46" name="Rectangle 45"/>
@@ -5598,7 +5528,7 @@
         </p:nvSpPr>
         <p:spPr>
           <a:xfrm>
-            <a:off x="5803996" y="4088595"/>
+            <a:off x="5695710" y="4088595"/>
             <a:ext cx="1103870" cy="263525"/>
           </a:xfrm>
           <a:prstGeom prst="rect">
@@ -5647,7 +5577,7 @@
         </p:nvSpPr>
         <p:spPr>
           <a:xfrm>
-            <a:off x="4357115" y="3796809"/>
+            <a:off x="4549905" y="4033835"/>
             <a:ext cx="458780" cy="369332"/>
           </a:xfrm>
           <a:prstGeom prst="rect">
@@ -5677,7 +5607,7 @@
         </p:nvSpPr>
         <p:spPr>
           <a:xfrm>
-            <a:off x="5803996" y="3797705"/>
+            <a:off x="5945321" y="4033835"/>
             <a:ext cx="614271" cy="369332"/>
           </a:xfrm>
           <a:prstGeom prst="rect">
@@ -5895,41 +5825,6 @@
           </a:fontRef>
         </p:style>
       </p:cxnSp>
-      <p:cxnSp>
-        <p:nvCxnSpPr>
-          <p:cNvPr id="61" name="Straight Connector 60"/>
-          <p:cNvCxnSpPr/>
-          <p:nvPr/>
-        </p:nvCxnSpPr>
-        <p:spPr>
-          <a:xfrm>
-            <a:off x="3547723" y="3823214"/>
-            <a:ext cx="0" cy="527050"/>
-          </a:xfrm>
-          <a:prstGeom prst="line">
-            <a:avLst/>
-          </a:prstGeom>
-          <a:ln w="28575">
-            <a:solidFill>
-              <a:srgbClr val="C00000"/>
-            </a:solidFill>
-          </a:ln>
-        </p:spPr>
-        <p:style>
-          <a:lnRef idx="1">
-            <a:schemeClr val="accent1"/>
-          </a:lnRef>
-          <a:fillRef idx="0">
-            <a:schemeClr val="accent1"/>
-          </a:fillRef>
-          <a:effectRef idx="0">
-            <a:schemeClr val="accent1"/>
-          </a:effectRef>
-          <a:fontRef idx="minor">
-            <a:schemeClr val="tx1"/>
-          </a:fontRef>
-        </p:style>
-      </p:cxnSp>
       <p:sp>
         <p:nvSpPr>
           <p:cNvPr id="62" name="Rectangle 61"/>
@@ -5987,7 +5882,7 @@
         </p:nvSpPr>
         <p:spPr>
           <a:xfrm>
-            <a:off x="3129060" y="3795351"/>
+            <a:off x="3143606" y="4033835"/>
             <a:ext cx="458780" cy="369332"/>
           </a:xfrm>
           <a:prstGeom prst="rect">
@@ -6668,6 +6563,1160 @@
           <a:chExt cx="0" cy="0"/>
         </a:xfrm>
       </p:grpSpPr>
+      <p:sp>
+        <p:nvSpPr>
+          <p:cNvPr id="2" name="TextBox 1"/>
+          <p:cNvSpPr txBox="1"/>
+          <p:nvPr/>
+        </p:nvSpPr>
+        <p:spPr>
+          <a:xfrm>
+            <a:off x="2137893" y="1378039"/>
+            <a:ext cx="556563" cy="369332"/>
+          </a:xfrm>
+          <a:prstGeom prst="rect">
+            <a:avLst/>
+          </a:prstGeom>
+          <a:noFill/>
+        </p:spPr>
+        <p:txBody>
+          <a:bodyPr wrap="none" rtlCol="0">
+            <a:spAutoFit/>
+          </a:bodyPr>
+          <a:lstStyle/>
+          <a:p>
+            <a:r>
+              <a:rPr lang="en-US" dirty="0" smtClean="0"/>
+              <a:t>GSR</a:t>
+            </a:r>
+            <a:endParaRPr lang="en-US" dirty="0"/>
+          </a:p>
+        </p:txBody>
+      </p:sp>
+      <p:sp>
+        <p:nvSpPr>
+          <p:cNvPr id="3" name="TextBox 2"/>
+          <p:cNvSpPr txBox="1"/>
+          <p:nvPr/>
+        </p:nvSpPr>
+        <p:spPr>
+          <a:xfrm>
+            <a:off x="2143343" y="2058473"/>
+            <a:ext cx="551113" cy="369332"/>
+          </a:xfrm>
+          <a:prstGeom prst="rect">
+            <a:avLst/>
+          </a:prstGeom>
+          <a:noFill/>
+        </p:spPr>
+        <p:txBody>
+          <a:bodyPr wrap="none" rtlCol="0">
+            <a:spAutoFit/>
+          </a:bodyPr>
+          <a:lstStyle/>
+          <a:p>
+            <a:r>
+              <a:rPr lang="en-US" dirty="0" smtClean="0"/>
+              <a:t>EEG</a:t>
+            </a:r>
+            <a:endParaRPr lang="en-US" dirty="0"/>
+          </a:p>
+        </p:txBody>
+      </p:sp>
+      <p:sp>
+        <p:nvSpPr>
+          <p:cNvPr id="4" name="TextBox 3"/>
+          <p:cNvSpPr txBox="1"/>
+          <p:nvPr/>
+        </p:nvSpPr>
+        <p:spPr>
+          <a:xfrm>
+            <a:off x="2137893" y="2765220"/>
+            <a:ext cx="450764" cy="369332"/>
+          </a:xfrm>
+          <a:prstGeom prst="rect">
+            <a:avLst/>
+          </a:prstGeom>
+          <a:noFill/>
+        </p:spPr>
+        <p:txBody>
+          <a:bodyPr wrap="none" rtlCol="0">
+            <a:spAutoFit/>
+          </a:bodyPr>
+          <a:lstStyle/>
+          <a:p>
+            <a:r>
+              <a:rPr lang="en-US" dirty="0" smtClean="0"/>
+              <a:t>HR</a:t>
+            </a:r>
+            <a:endParaRPr lang="en-US" dirty="0"/>
+          </a:p>
+        </p:txBody>
+      </p:sp>
+      <p:sp>
+        <p:nvSpPr>
+          <p:cNvPr id="5" name="TextBox 4"/>
+          <p:cNvSpPr txBox="1"/>
+          <p:nvPr/>
+        </p:nvSpPr>
+        <p:spPr>
+          <a:xfrm>
+            <a:off x="2137893" y="3467957"/>
+            <a:ext cx="760144" cy="369332"/>
+          </a:xfrm>
+          <a:prstGeom prst="rect">
+            <a:avLst/>
+          </a:prstGeom>
+          <a:noFill/>
+        </p:spPr>
+        <p:txBody>
+          <a:bodyPr wrap="none" rtlCol="0">
+            <a:spAutoFit/>
+          </a:bodyPr>
+          <a:lstStyle/>
+          <a:p>
+            <a:r>
+              <a:rPr lang="en-US" dirty="0" smtClean="0"/>
+              <a:t>Kinect</a:t>
+            </a:r>
+          </a:p>
+        </p:txBody>
+      </p:sp>
+      <p:cxnSp>
+        <p:nvCxnSpPr>
+          <p:cNvPr id="6" name="Straight Arrow Connector 5"/>
+          <p:cNvCxnSpPr/>
+          <p:nvPr/>
+        </p:nvCxnSpPr>
+        <p:spPr>
+          <a:xfrm>
+            <a:off x="2844578" y="1607534"/>
+            <a:ext cx="5063050" cy="0"/>
+          </a:xfrm>
+          <a:prstGeom prst="straightConnector1">
+            <a:avLst/>
+          </a:prstGeom>
+          <a:ln>
+            <a:solidFill>
+              <a:schemeClr val="tx1"/>
+            </a:solidFill>
+            <a:tailEnd type="triangle"/>
+          </a:ln>
+        </p:spPr>
+        <p:style>
+          <a:lnRef idx="1">
+            <a:schemeClr val="accent1"/>
+          </a:lnRef>
+          <a:fillRef idx="0">
+            <a:schemeClr val="accent1"/>
+          </a:fillRef>
+          <a:effectRef idx="0">
+            <a:schemeClr val="accent1"/>
+          </a:effectRef>
+          <a:fontRef idx="minor">
+            <a:schemeClr val="tx1"/>
+          </a:fontRef>
+        </p:style>
+      </p:cxnSp>
+      <p:sp>
+        <p:nvSpPr>
+          <p:cNvPr id="9" name="Rectangle 8"/>
+          <p:cNvSpPr/>
+          <p:nvPr/>
+        </p:nvSpPr>
+        <p:spPr>
+          <a:xfrm>
+            <a:off x="3026535" y="1341684"/>
+            <a:ext cx="2199292" cy="265851"/>
+          </a:xfrm>
+          <a:prstGeom prst="rect">
+            <a:avLst/>
+          </a:prstGeom>
+          <a:solidFill>
+            <a:schemeClr val="accent1">
+              <a:lumMod val="75000"/>
+              <a:alpha val="54000"/>
+            </a:schemeClr>
+          </a:solidFill>
+          <a:ln>
+            <a:noFill/>
+          </a:ln>
+        </p:spPr>
+        <p:style>
+          <a:lnRef idx="2">
+            <a:schemeClr val="accent1">
+              <a:shade val="50000"/>
+            </a:schemeClr>
+          </a:lnRef>
+          <a:fillRef idx="1">
+            <a:schemeClr val="accent1"/>
+          </a:fillRef>
+          <a:effectRef idx="0">
+            <a:schemeClr val="accent1"/>
+          </a:effectRef>
+          <a:fontRef idx="minor">
+            <a:schemeClr val="lt1"/>
+          </a:fontRef>
+        </p:style>
+        <p:txBody>
+          <a:bodyPr rtlCol="0" anchor="ctr"/>
+          <a:lstStyle/>
+          <a:p>
+            <a:pPr algn="ctr"/>
+            <a:endParaRPr lang="en-US"/>
+          </a:p>
+        </p:txBody>
+      </p:sp>
+      <p:sp>
+        <p:nvSpPr>
+          <p:cNvPr id="20" name="Rectangle 19"/>
+          <p:cNvSpPr/>
+          <p:nvPr/>
+        </p:nvSpPr>
+        <p:spPr>
+          <a:xfrm>
+            <a:off x="6265725" y="1337932"/>
+            <a:ext cx="1500236" cy="267278"/>
+          </a:xfrm>
+          <a:prstGeom prst="rect">
+            <a:avLst/>
+          </a:prstGeom>
+          <a:solidFill>
+            <a:schemeClr val="accent1">
+              <a:lumMod val="75000"/>
+              <a:alpha val="54000"/>
+            </a:schemeClr>
+          </a:solidFill>
+          <a:ln>
+            <a:noFill/>
+          </a:ln>
+        </p:spPr>
+        <p:style>
+          <a:lnRef idx="2">
+            <a:schemeClr val="accent1">
+              <a:shade val="50000"/>
+            </a:schemeClr>
+          </a:lnRef>
+          <a:fillRef idx="1">
+            <a:schemeClr val="accent1"/>
+          </a:fillRef>
+          <a:effectRef idx="0">
+            <a:schemeClr val="accent1"/>
+          </a:effectRef>
+          <a:fontRef idx="minor">
+            <a:schemeClr val="lt1"/>
+          </a:fontRef>
+        </p:style>
+        <p:txBody>
+          <a:bodyPr rtlCol="0" anchor="ctr"/>
+          <a:lstStyle/>
+          <a:p>
+            <a:pPr algn="ctr"/>
+            <a:endParaRPr lang="en-US"/>
+          </a:p>
+        </p:txBody>
+      </p:sp>
+      <p:cxnSp>
+        <p:nvCxnSpPr>
+          <p:cNvPr id="21" name="Straight Arrow Connector 20"/>
+          <p:cNvCxnSpPr/>
+          <p:nvPr/>
+        </p:nvCxnSpPr>
+        <p:spPr>
+          <a:xfrm>
+            <a:off x="2844578" y="2285854"/>
+            <a:ext cx="5063050" cy="0"/>
+          </a:xfrm>
+          <a:prstGeom prst="straightConnector1">
+            <a:avLst/>
+          </a:prstGeom>
+          <a:ln>
+            <a:solidFill>
+              <a:schemeClr val="tx1"/>
+            </a:solidFill>
+            <a:tailEnd type="triangle"/>
+          </a:ln>
+        </p:spPr>
+        <p:style>
+          <a:lnRef idx="1">
+            <a:schemeClr val="accent1"/>
+          </a:lnRef>
+          <a:fillRef idx="0">
+            <a:schemeClr val="accent1"/>
+          </a:fillRef>
+          <a:effectRef idx="0">
+            <a:schemeClr val="accent1"/>
+          </a:effectRef>
+          <a:fontRef idx="minor">
+            <a:schemeClr val="tx1"/>
+          </a:fontRef>
+        </p:style>
+      </p:cxnSp>
+      <p:sp>
+        <p:nvSpPr>
+          <p:cNvPr id="27" name="Rectangle 26"/>
+          <p:cNvSpPr/>
+          <p:nvPr/>
+        </p:nvSpPr>
+        <p:spPr>
+          <a:xfrm>
+            <a:off x="6265725" y="2016252"/>
+            <a:ext cx="1500236" cy="267278"/>
+          </a:xfrm>
+          <a:prstGeom prst="rect">
+            <a:avLst/>
+          </a:prstGeom>
+          <a:solidFill>
+            <a:schemeClr val="accent1">
+              <a:lumMod val="75000"/>
+              <a:alpha val="54000"/>
+            </a:schemeClr>
+          </a:solidFill>
+          <a:ln>
+            <a:noFill/>
+          </a:ln>
+        </p:spPr>
+        <p:style>
+          <a:lnRef idx="2">
+            <a:schemeClr val="accent1">
+              <a:shade val="50000"/>
+            </a:schemeClr>
+          </a:lnRef>
+          <a:fillRef idx="1">
+            <a:schemeClr val="accent1"/>
+          </a:fillRef>
+          <a:effectRef idx="0">
+            <a:schemeClr val="accent1"/>
+          </a:effectRef>
+          <a:fontRef idx="minor">
+            <a:schemeClr val="lt1"/>
+          </a:fontRef>
+        </p:style>
+        <p:txBody>
+          <a:bodyPr rtlCol="0" anchor="ctr"/>
+          <a:lstStyle/>
+          <a:p>
+            <a:pPr algn="ctr"/>
+            <a:endParaRPr lang="en-US"/>
+          </a:p>
+        </p:txBody>
+      </p:sp>
+      <p:cxnSp>
+        <p:nvCxnSpPr>
+          <p:cNvPr id="28" name="Straight Arrow Connector 27"/>
+          <p:cNvCxnSpPr/>
+          <p:nvPr/>
+        </p:nvCxnSpPr>
+        <p:spPr>
+          <a:xfrm>
+            <a:off x="2844578" y="2970251"/>
+            <a:ext cx="5063050" cy="0"/>
+          </a:xfrm>
+          <a:prstGeom prst="straightConnector1">
+            <a:avLst/>
+          </a:prstGeom>
+          <a:ln>
+            <a:solidFill>
+              <a:schemeClr val="tx1"/>
+            </a:solidFill>
+            <a:tailEnd type="triangle"/>
+          </a:ln>
+        </p:spPr>
+        <p:style>
+          <a:lnRef idx="1">
+            <a:schemeClr val="accent1"/>
+          </a:lnRef>
+          <a:fillRef idx="0">
+            <a:schemeClr val="accent1"/>
+          </a:fillRef>
+          <a:effectRef idx="0">
+            <a:schemeClr val="accent1"/>
+          </a:effectRef>
+          <a:fontRef idx="minor">
+            <a:schemeClr val="tx1"/>
+          </a:fontRef>
+        </p:style>
+      </p:cxnSp>
+      <p:sp>
+        <p:nvSpPr>
+          <p:cNvPr id="30" name="Rectangle 29"/>
+          <p:cNvSpPr/>
+          <p:nvPr/>
+        </p:nvSpPr>
+        <p:spPr>
+          <a:xfrm>
+            <a:off x="2898037" y="2704401"/>
+            <a:ext cx="2150870" cy="265851"/>
+          </a:xfrm>
+          <a:prstGeom prst="rect">
+            <a:avLst/>
+          </a:prstGeom>
+          <a:solidFill>
+            <a:schemeClr val="accent1">
+              <a:lumMod val="75000"/>
+              <a:alpha val="54000"/>
+            </a:schemeClr>
+          </a:solidFill>
+          <a:ln>
+            <a:noFill/>
+          </a:ln>
+        </p:spPr>
+        <p:style>
+          <a:lnRef idx="2">
+            <a:schemeClr val="accent1">
+              <a:shade val="50000"/>
+            </a:schemeClr>
+          </a:lnRef>
+          <a:fillRef idx="1">
+            <a:schemeClr val="accent1"/>
+          </a:fillRef>
+          <a:effectRef idx="0">
+            <a:schemeClr val="accent1"/>
+          </a:effectRef>
+          <a:fontRef idx="minor">
+            <a:schemeClr val="lt1"/>
+          </a:fontRef>
+        </p:style>
+        <p:txBody>
+          <a:bodyPr rtlCol="0" anchor="ctr"/>
+          <a:lstStyle/>
+          <a:p>
+            <a:pPr algn="ctr"/>
+            <a:endParaRPr lang="en-US"/>
+          </a:p>
+        </p:txBody>
+      </p:sp>
+      <p:sp>
+        <p:nvSpPr>
+          <p:cNvPr id="34" name="Rectangle 33"/>
+          <p:cNvSpPr/>
+          <p:nvPr/>
+        </p:nvSpPr>
+        <p:spPr>
+          <a:xfrm>
+            <a:off x="6265725" y="2700649"/>
+            <a:ext cx="1500236" cy="267278"/>
+          </a:xfrm>
+          <a:prstGeom prst="rect">
+            <a:avLst/>
+          </a:prstGeom>
+          <a:solidFill>
+            <a:schemeClr val="accent1">
+              <a:lumMod val="75000"/>
+              <a:alpha val="54000"/>
+            </a:schemeClr>
+          </a:solidFill>
+          <a:ln>
+            <a:noFill/>
+          </a:ln>
+        </p:spPr>
+        <p:style>
+          <a:lnRef idx="2">
+            <a:schemeClr val="accent1">
+              <a:shade val="50000"/>
+            </a:schemeClr>
+          </a:lnRef>
+          <a:fillRef idx="1">
+            <a:schemeClr val="accent1"/>
+          </a:fillRef>
+          <a:effectRef idx="0">
+            <a:schemeClr val="accent1"/>
+          </a:effectRef>
+          <a:fontRef idx="minor">
+            <a:schemeClr val="lt1"/>
+          </a:fontRef>
+        </p:style>
+        <p:txBody>
+          <a:bodyPr rtlCol="0" anchor="ctr"/>
+          <a:lstStyle/>
+          <a:p>
+            <a:pPr algn="ctr"/>
+            <a:endParaRPr lang="en-US"/>
+          </a:p>
+        </p:txBody>
+      </p:sp>
+      <p:cxnSp>
+        <p:nvCxnSpPr>
+          <p:cNvPr id="35" name="Straight Arrow Connector 34"/>
+          <p:cNvCxnSpPr/>
+          <p:nvPr/>
+        </p:nvCxnSpPr>
+        <p:spPr>
+          <a:xfrm>
+            <a:off x="2844578" y="3654948"/>
+            <a:ext cx="5063050" cy="0"/>
+          </a:xfrm>
+          <a:prstGeom prst="straightConnector1">
+            <a:avLst/>
+          </a:prstGeom>
+          <a:ln>
+            <a:solidFill>
+              <a:schemeClr val="tx1"/>
+            </a:solidFill>
+            <a:tailEnd type="triangle"/>
+          </a:ln>
+        </p:spPr>
+        <p:style>
+          <a:lnRef idx="1">
+            <a:schemeClr val="accent1"/>
+          </a:lnRef>
+          <a:fillRef idx="0">
+            <a:schemeClr val="accent1"/>
+          </a:fillRef>
+          <a:effectRef idx="0">
+            <a:schemeClr val="accent1"/>
+          </a:effectRef>
+          <a:fontRef idx="minor">
+            <a:schemeClr val="tx1"/>
+          </a:fontRef>
+        </p:style>
+      </p:cxnSp>
+      <p:sp>
+        <p:nvSpPr>
+          <p:cNvPr id="37" name="Rectangle 36"/>
+          <p:cNvSpPr/>
+          <p:nvPr/>
+        </p:nvSpPr>
+        <p:spPr>
+          <a:xfrm>
+            <a:off x="4080122" y="3388799"/>
+            <a:ext cx="1895734" cy="266149"/>
+          </a:xfrm>
+          <a:prstGeom prst="rect">
+            <a:avLst/>
+          </a:prstGeom>
+          <a:solidFill>
+            <a:schemeClr val="accent1">
+              <a:lumMod val="75000"/>
+              <a:alpha val="54000"/>
+            </a:schemeClr>
+          </a:solidFill>
+          <a:ln>
+            <a:noFill/>
+          </a:ln>
+        </p:spPr>
+        <p:style>
+          <a:lnRef idx="2">
+            <a:schemeClr val="accent1">
+              <a:shade val="50000"/>
+            </a:schemeClr>
+          </a:lnRef>
+          <a:fillRef idx="1">
+            <a:schemeClr val="accent1"/>
+          </a:fillRef>
+          <a:effectRef idx="0">
+            <a:schemeClr val="accent1"/>
+          </a:effectRef>
+          <a:fontRef idx="minor">
+            <a:schemeClr val="lt1"/>
+          </a:fontRef>
+        </p:style>
+        <p:txBody>
+          <a:bodyPr rtlCol="0" anchor="ctr"/>
+          <a:lstStyle/>
+          <a:p>
+            <a:pPr algn="ctr"/>
+            <a:endParaRPr lang="en-US"/>
+          </a:p>
+        </p:txBody>
+      </p:sp>
+      <p:sp>
+        <p:nvSpPr>
+          <p:cNvPr id="41" name="Rectangle 40"/>
+          <p:cNvSpPr/>
+          <p:nvPr/>
+        </p:nvSpPr>
+        <p:spPr>
+          <a:xfrm>
+            <a:off x="6265725" y="3385346"/>
+            <a:ext cx="1500236" cy="267278"/>
+          </a:xfrm>
+          <a:prstGeom prst="rect">
+            <a:avLst/>
+          </a:prstGeom>
+          <a:solidFill>
+            <a:schemeClr val="accent1">
+              <a:lumMod val="75000"/>
+              <a:alpha val="54000"/>
+            </a:schemeClr>
+          </a:solidFill>
+          <a:ln>
+            <a:noFill/>
+          </a:ln>
+        </p:spPr>
+        <p:style>
+          <a:lnRef idx="2">
+            <a:schemeClr val="accent1">
+              <a:shade val="50000"/>
+            </a:schemeClr>
+          </a:lnRef>
+          <a:fillRef idx="1">
+            <a:schemeClr val="accent1"/>
+          </a:fillRef>
+          <a:effectRef idx="0">
+            <a:schemeClr val="accent1"/>
+          </a:effectRef>
+          <a:fontRef idx="minor">
+            <a:schemeClr val="lt1"/>
+          </a:fontRef>
+        </p:style>
+        <p:txBody>
+          <a:bodyPr rtlCol="0" anchor="ctr"/>
+          <a:lstStyle/>
+          <a:p>
+            <a:pPr algn="ctr"/>
+            <a:endParaRPr lang="en-US"/>
+          </a:p>
+        </p:txBody>
+      </p:sp>
+      <p:cxnSp>
+        <p:nvCxnSpPr>
+          <p:cNvPr id="43" name="Straight Connector 42"/>
+          <p:cNvCxnSpPr/>
+          <p:nvPr/>
+        </p:nvCxnSpPr>
+        <p:spPr>
+          <a:xfrm flipV="1">
+            <a:off x="3876541" y="1005189"/>
+            <a:ext cx="0" cy="2871374"/>
+          </a:xfrm>
+          <a:prstGeom prst="line">
+            <a:avLst/>
+          </a:prstGeom>
+          <a:ln w="28575">
+            <a:solidFill>
+              <a:schemeClr val="tx1"/>
+            </a:solidFill>
+          </a:ln>
+        </p:spPr>
+        <p:style>
+          <a:lnRef idx="1">
+            <a:schemeClr val="accent1"/>
+          </a:lnRef>
+          <a:fillRef idx="0">
+            <a:schemeClr val="accent1"/>
+          </a:fillRef>
+          <a:effectRef idx="0">
+            <a:schemeClr val="accent1"/>
+          </a:effectRef>
+          <a:fontRef idx="minor">
+            <a:schemeClr val="tx1"/>
+          </a:fontRef>
+        </p:style>
+      </p:cxnSp>
+      <mc:AlternateContent xmlns:mc="http://schemas.openxmlformats.org/markup-compatibility/2006">
+        <mc:Choice xmlns:a14="http://schemas.microsoft.com/office/drawing/2010/main" Requires="a14">
+          <p:sp>
+            <p:nvSpPr>
+              <p:cNvPr id="44" name="TextBox 43"/>
+              <p:cNvSpPr txBox="1"/>
+              <p:nvPr/>
+            </p:nvSpPr>
+            <p:spPr>
+              <a:xfrm>
+                <a:off x="3662764" y="3798652"/>
+                <a:ext cx="427553" cy="369332"/>
+              </a:xfrm>
+              <a:prstGeom prst="rect">
+                <a:avLst/>
+              </a:prstGeom>
+              <a:noFill/>
+            </p:spPr>
+            <p:txBody>
+              <a:bodyPr wrap="none" rtlCol="0">
+                <a:spAutoFit/>
+              </a:bodyPr>
+              <a:lstStyle/>
+              <a:p>
+                <a14:m>
+                  <m:oMathPara xmlns:m="http://schemas.openxmlformats.org/officeDocument/2006/math">
+                    <m:oMathParaPr>
+                      <m:jc m:val="centerGroup"/>
+                    </m:oMathParaPr>
+                    <m:oMath xmlns:m="http://schemas.openxmlformats.org/officeDocument/2006/math">
+                      <m:sSub>
+                        <m:sSubPr>
+                          <m:ctrlPr>
+                            <a:rPr lang="da-DK" b="0" i="1" smtClean="0">
+                              <a:latin typeface="Cambria Math" panose="02040503050406030204" pitchFamily="18" charset="0"/>
+                            </a:rPr>
+                          </m:ctrlPr>
+                        </m:sSubPr>
+                        <m:e>
+                          <m:r>
+                            <a:rPr lang="da-DK" b="0" i="1" smtClean="0">
+                              <a:latin typeface="Cambria Math" panose="02040503050406030204" pitchFamily="18" charset="0"/>
+                            </a:rPr>
+                            <m:t>𝑡</m:t>
+                          </m:r>
+                        </m:e>
+                        <m:sub>
+                          <m:r>
+                            <a:rPr lang="da-DK" b="0" i="1" smtClean="0">
+                              <a:latin typeface="Cambria Math" panose="02040503050406030204" pitchFamily="18" charset="0"/>
+                            </a:rPr>
+                            <m:t>1</m:t>
+                          </m:r>
+                        </m:sub>
+                      </m:sSub>
+                    </m:oMath>
+                  </m:oMathPara>
+                </a14:m>
+                <a:endParaRPr lang="en-US" dirty="0"/>
+              </a:p>
+            </p:txBody>
+          </p:sp>
+        </mc:Choice>
+        <mc:Fallback>
+          <p:sp>
+            <p:nvSpPr>
+              <p:cNvPr id="44" name="TextBox 43"/>
+              <p:cNvSpPr txBox="1">
+                <a:spLocks noRot="1" noChangeAspect="1" noMove="1" noResize="1" noEditPoints="1" noAdjustHandles="1" noChangeArrowheads="1" noChangeShapeType="1" noTextEdit="1"/>
+              </p:cNvSpPr>
+              <p:nvPr/>
+            </p:nvSpPr>
+            <p:spPr>
+              <a:xfrm>
+                <a:off x="3662764" y="3798652"/>
+                <a:ext cx="427553" cy="369332"/>
+              </a:xfrm>
+              <a:prstGeom prst="rect">
+                <a:avLst/>
+              </a:prstGeom>
+              <a:blipFill rotWithShape="0">
+                <a:blip r:embed="rId2"/>
+                <a:stretch>
+                  <a:fillRect/>
+                </a:stretch>
+              </a:blipFill>
+            </p:spPr>
+            <p:txBody>
+              <a:bodyPr/>
+              <a:lstStyle/>
+              <a:p>
+                <a:r>
+                  <a:rPr lang="en-US">
+                    <a:noFill/>
+                  </a:rPr>
+                  <a:t> </a:t>
+                </a:r>
+              </a:p>
+            </p:txBody>
+          </p:sp>
+        </mc:Fallback>
+      </mc:AlternateContent>
+      <p:cxnSp>
+        <p:nvCxnSpPr>
+          <p:cNvPr id="45" name="Straight Connector 44"/>
+          <p:cNvCxnSpPr/>
+          <p:nvPr/>
+        </p:nvCxnSpPr>
+        <p:spPr>
+          <a:xfrm flipV="1">
+            <a:off x="4716861" y="1005189"/>
+            <a:ext cx="0" cy="2871374"/>
+          </a:xfrm>
+          <a:prstGeom prst="line">
+            <a:avLst/>
+          </a:prstGeom>
+          <a:ln w="28575">
+            <a:solidFill>
+              <a:schemeClr val="tx1"/>
+            </a:solidFill>
+          </a:ln>
+        </p:spPr>
+        <p:style>
+          <a:lnRef idx="1">
+            <a:schemeClr val="accent1"/>
+          </a:lnRef>
+          <a:fillRef idx="0">
+            <a:schemeClr val="accent1"/>
+          </a:fillRef>
+          <a:effectRef idx="0">
+            <a:schemeClr val="accent1"/>
+          </a:effectRef>
+          <a:fontRef idx="minor">
+            <a:schemeClr val="tx1"/>
+          </a:fontRef>
+        </p:style>
+      </p:cxnSp>
+      <mc:AlternateContent xmlns:mc="http://schemas.openxmlformats.org/markup-compatibility/2006">
+        <mc:Choice xmlns:a14="http://schemas.microsoft.com/office/drawing/2010/main" Requires="a14">
+          <p:sp>
+            <p:nvSpPr>
+              <p:cNvPr id="46" name="TextBox 45"/>
+              <p:cNvSpPr txBox="1"/>
+              <p:nvPr/>
+            </p:nvSpPr>
+            <p:spPr>
+              <a:xfrm>
+                <a:off x="4503084" y="3798652"/>
+                <a:ext cx="432875" cy="369332"/>
+              </a:xfrm>
+              <a:prstGeom prst="rect">
+                <a:avLst/>
+              </a:prstGeom>
+              <a:noFill/>
+            </p:spPr>
+            <p:txBody>
+              <a:bodyPr wrap="none" rtlCol="0">
+                <a:spAutoFit/>
+              </a:bodyPr>
+              <a:lstStyle/>
+              <a:p>
+                <a14:m>
+                  <m:oMathPara xmlns:m="http://schemas.openxmlformats.org/officeDocument/2006/math">
+                    <m:oMathParaPr>
+                      <m:jc m:val="centerGroup"/>
+                    </m:oMathParaPr>
+                    <m:oMath xmlns:m="http://schemas.openxmlformats.org/officeDocument/2006/math">
+                      <m:sSub>
+                        <m:sSubPr>
+                          <m:ctrlPr>
+                            <a:rPr lang="da-DK" b="0" i="1" smtClean="0">
+                              <a:latin typeface="Cambria Math" panose="02040503050406030204" pitchFamily="18" charset="0"/>
+                            </a:rPr>
+                          </m:ctrlPr>
+                        </m:sSubPr>
+                        <m:e>
+                          <m:r>
+                            <a:rPr lang="da-DK" b="0" i="1" smtClean="0">
+                              <a:latin typeface="Cambria Math" panose="02040503050406030204" pitchFamily="18" charset="0"/>
+                            </a:rPr>
+                            <m:t>𝑡</m:t>
+                          </m:r>
+                        </m:e>
+                        <m:sub>
+                          <m:r>
+                            <a:rPr lang="da-DK" b="0" i="1" smtClean="0">
+                              <a:latin typeface="Cambria Math" panose="02040503050406030204" pitchFamily="18" charset="0"/>
+                            </a:rPr>
+                            <m:t>2</m:t>
+                          </m:r>
+                        </m:sub>
+                      </m:sSub>
+                    </m:oMath>
+                  </m:oMathPara>
+                </a14:m>
+                <a:endParaRPr lang="en-US" dirty="0"/>
+              </a:p>
+            </p:txBody>
+          </p:sp>
+        </mc:Choice>
+        <mc:Fallback>
+          <p:sp>
+            <p:nvSpPr>
+              <p:cNvPr id="46" name="TextBox 45"/>
+              <p:cNvSpPr txBox="1">
+                <a:spLocks noRot="1" noChangeAspect="1" noMove="1" noResize="1" noEditPoints="1" noAdjustHandles="1" noChangeArrowheads="1" noChangeShapeType="1" noTextEdit="1"/>
+              </p:cNvSpPr>
+              <p:nvPr/>
+            </p:nvSpPr>
+            <p:spPr>
+              <a:xfrm>
+                <a:off x="4503084" y="3798652"/>
+                <a:ext cx="432875" cy="369332"/>
+              </a:xfrm>
+              <a:prstGeom prst="rect">
+                <a:avLst/>
+              </a:prstGeom>
+              <a:blipFill rotWithShape="0">
+                <a:blip r:embed="rId3"/>
+                <a:stretch>
+                  <a:fillRect/>
+                </a:stretch>
+              </a:blipFill>
+            </p:spPr>
+            <p:txBody>
+              <a:bodyPr/>
+              <a:lstStyle/>
+              <a:p>
+                <a:r>
+                  <a:rPr lang="en-US">
+                    <a:noFill/>
+                  </a:rPr>
+                  <a:t> </a:t>
+                </a:r>
+              </a:p>
+            </p:txBody>
+          </p:sp>
+        </mc:Fallback>
+      </mc:AlternateContent>
+      <p:cxnSp>
+        <p:nvCxnSpPr>
+          <p:cNvPr id="47" name="Straight Connector 46"/>
+          <p:cNvCxnSpPr/>
+          <p:nvPr/>
+        </p:nvCxnSpPr>
+        <p:spPr>
+          <a:xfrm flipV="1">
+            <a:off x="5600841" y="1011275"/>
+            <a:ext cx="0" cy="2871374"/>
+          </a:xfrm>
+          <a:prstGeom prst="line">
+            <a:avLst/>
+          </a:prstGeom>
+          <a:ln w="28575">
+            <a:solidFill>
+              <a:schemeClr val="tx1"/>
+            </a:solidFill>
+          </a:ln>
+        </p:spPr>
+        <p:style>
+          <a:lnRef idx="1">
+            <a:schemeClr val="accent1"/>
+          </a:lnRef>
+          <a:fillRef idx="0">
+            <a:schemeClr val="accent1"/>
+          </a:fillRef>
+          <a:effectRef idx="0">
+            <a:schemeClr val="accent1"/>
+          </a:effectRef>
+          <a:fontRef idx="minor">
+            <a:schemeClr val="tx1"/>
+          </a:fontRef>
+        </p:style>
+      </p:cxnSp>
+      <mc:AlternateContent xmlns:mc="http://schemas.openxmlformats.org/markup-compatibility/2006">
+        <mc:Choice xmlns:a14="http://schemas.microsoft.com/office/drawing/2010/main" Requires="a14">
+          <p:sp>
+            <p:nvSpPr>
+              <p:cNvPr id="48" name="TextBox 47"/>
+              <p:cNvSpPr txBox="1"/>
+              <p:nvPr/>
+            </p:nvSpPr>
+            <p:spPr>
+              <a:xfrm>
+                <a:off x="5387064" y="3804738"/>
+                <a:ext cx="432875" cy="369332"/>
+              </a:xfrm>
+              <a:prstGeom prst="rect">
+                <a:avLst/>
+              </a:prstGeom>
+              <a:noFill/>
+            </p:spPr>
+            <p:txBody>
+              <a:bodyPr wrap="none" rtlCol="0">
+                <a:spAutoFit/>
+              </a:bodyPr>
+              <a:lstStyle/>
+              <a:p>
+                <a14:m>
+                  <m:oMathPara xmlns:m="http://schemas.openxmlformats.org/officeDocument/2006/math">
+                    <m:oMathParaPr>
+                      <m:jc m:val="centerGroup"/>
+                    </m:oMathParaPr>
+                    <m:oMath xmlns:m="http://schemas.openxmlformats.org/officeDocument/2006/math">
+                      <m:sSub>
+                        <m:sSubPr>
+                          <m:ctrlPr>
+                            <a:rPr lang="da-DK" b="0" i="1" smtClean="0">
+                              <a:latin typeface="Cambria Math" panose="02040503050406030204" pitchFamily="18" charset="0"/>
+                            </a:rPr>
+                          </m:ctrlPr>
+                        </m:sSubPr>
+                        <m:e>
+                          <m:r>
+                            <a:rPr lang="da-DK" b="0" i="1" smtClean="0">
+                              <a:latin typeface="Cambria Math" panose="02040503050406030204" pitchFamily="18" charset="0"/>
+                            </a:rPr>
+                            <m:t>𝑡</m:t>
+                          </m:r>
+                        </m:e>
+                        <m:sub>
+                          <m:r>
+                            <a:rPr lang="da-DK" b="0" i="1" smtClean="0">
+                              <a:latin typeface="Cambria Math" panose="02040503050406030204" pitchFamily="18" charset="0"/>
+                            </a:rPr>
+                            <m:t>3</m:t>
+                          </m:r>
+                        </m:sub>
+                      </m:sSub>
+                    </m:oMath>
+                  </m:oMathPara>
+                </a14:m>
+                <a:endParaRPr lang="en-US" dirty="0"/>
+              </a:p>
+            </p:txBody>
+          </p:sp>
+        </mc:Choice>
+        <mc:Fallback>
+          <p:sp>
+            <p:nvSpPr>
+              <p:cNvPr id="48" name="TextBox 47"/>
+              <p:cNvSpPr txBox="1">
+                <a:spLocks noRot="1" noChangeAspect="1" noMove="1" noResize="1" noEditPoints="1" noAdjustHandles="1" noChangeArrowheads="1" noChangeShapeType="1" noTextEdit="1"/>
+              </p:cNvSpPr>
+              <p:nvPr/>
+            </p:nvSpPr>
+            <p:spPr>
+              <a:xfrm>
+                <a:off x="5387064" y="3804738"/>
+                <a:ext cx="432875" cy="369332"/>
+              </a:xfrm>
+              <a:prstGeom prst="rect">
+                <a:avLst/>
+              </a:prstGeom>
+              <a:blipFill rotWithShape="0">
+                <a:blip r:embed="rId4"/>
+                <a:stretch>
+                  <a:fillRect/>
+                </a:stretch>
+              </a:blipFill>
+            </p:spPr>
+            <p:txBody>
+              <a:bodyPr/>
+              <a:lstStyle/>
+              <a:p>
+                <a:r>
+                  <a:rPr lang="en-US">
+                    <a:noFill/>
+                  </a:rPr>
+                  <a:t> </a:t>
+                </a:r>
+              </a:p>
+            </p:txBody>
+          </p:sp>
+        </mc:Fallback>
+      </mc:AlternateContent>
+      <p:cxnSp>
+        <p:nvCxnSpPr>
+          <p:cNvPr id="49" name="Straight Connector 48"/>
+          <p:cNvCxnSpPr/>
+          <p:nvPr/>
+        </p:nvCxnSpPr>
+        <p:spPr>
+          <a:xfrm flipV="1">
+            <a:off x="7052200" y="1008522"/>
+            <a:ext cx="0" cy="2871374"/>
+          </a:xfrm>
+          <a:prstGeom prst="line">
+            <a:avLst/>
+          </a:prstGeom>
+          <a:ln w="28575">
+            <a:solidFill>
+              <a:schemeClr val="tx1"/>
+            </a:solidFill>
+          </a:ln>
+        </p:spPr>
+        <p:style>
+          <a:lnRef idx="1">
+            <a:schemeClr val="accent1"/>
+          </a:lnRef>
+          <a:fillRef idx="0">
+            <a:schemeClr val="accent1"/>
+          </a:fillRef>
+          <a:effectRef idx="0">
+            <a:schemeClr val="accent1"/>
+          </a:effectRef>
+          <a:fontRef idx="minor">
+            <a:schemeClr val="tx1"/>
+          </a:fontRef>
+        </p:style>
+      </p:cxnSp>
+      <mc:AlternateContent xmlns:mc="http://schemas.openxmlformats.org/markup-compatibility/2006">
+        <mc:Choice xmlns:a14="http://schemas.microsoft.com/office/drawing/2010/main" Requires="a14">
+          <p:sp>
+            <p:nvSpPr>
+              <p:cNvPr id="50" name="TextBox 49"/>
+              <p:cNvSpPr txBox="1"/>
+              <p:nvPr/>
+            </p:nvSpPr>
+            <p:spPr>
+              <a:xfrm>
+                <a:off x="6835762" y="3807704"/>
+                <a:ext cx="432875" cy="369332"/>
+              </a:xfrm>
+              <a:prstGeom prst="rect">
+                <a:avLst/>
+              </a:prstGeom>
+              <a:noFill/>
+            </p:spPr>
+            <p:txBody>
+              <a:bodyPr wrap="none" rtlCol="0">
+                <a:spAutoFit/>
+              </a:bodyPr>
+              <a:lstStyle/>
+              <a:p>
+                <a14:m>
+                  <m:oMathPara xmlns:m="http://schemas.openxmlformats.org/officeDocument/2006/math">
+                    <m:oMathParaPr>
+                      <m:jc m:val="centerGroup"/>
+                    </m:oMathParaPr>
+                    <m:oMath xmlns:m="http://schemas.openxmlformats.org/officeDocument/2006/math">
+                      <m:sSub>
+                        <m:sSubPr>
+                          <m:ctrlPr>
+                            <a:rPr lang="da-DK" b="0" i="1" smtClean="0">
+                              <a:latin typeface="Cambria Math" panose="02040503050406030204" pitchFamily="18" charset="0"/>
+                            </a:rPr>
+                          </m:ctrlPr>
+                        </m:sSubPr>
+                        <m:e>
+                          <m:r>
+                            <a:rPr lang="da-DK" b="0" i="1" smtClean="0">
+                              <a:latin typeface="Cambria Math" panose="02040503050406030204" pitchFamily="18" charset="0"/>
+                            </a:rPr>
+                            <m:t>𝑡</m:t>
+                          </m:r>
+                        </m:e>
+                        <m:sub>
+                          <m:r>
+                            <a:rPr lang="da-DK" b="0" i="1" smtClean="0">
+                              <a:latin typeface="Cambria Math" panose="02040503050406030204" pitchFamily="18" charset="0"/>
+                            </a:rPr>
+                            <m:t>4</m:t>
+                          </m:r>
+                        </m:sub>
+                      </m:sSub>
+                    </m:oMath>
+                  </m:oMathPara>
+                </a14:m>
+                <a:endParaRPr lang="en-US" dirty="0"/>
+              </a:p>
+            </p:txBody>
+          </p:sp>
+        </mc:Choice>
+        <mc:Fallback>
+          <p:sp>
+            <p:nvSpPr>
+              <p:cNvPr id="50" name="TextBox 49"/>
+              <p:cNvSpPr txBox="1">
+                <a:spLocks noRot="1" noChangeAspect="1" noMove="1" noResize="1" noEditPoints="1" noAdjustHandles="1" noChangeArrowheads="1" noChangeShapeType="1" noTextEdit="1"/>
+              </p:cNvSpPr>
+              <p:nvPr/>
+            </p:nvSpPr>
+            <p:spPr>
+              <a:xfrm>
+                <a:off x="6835762" y="3807704"/>
+                <a:ext cx="432875" cy="369332"/>
+              </a:xfrm>
+              <a:prstGeom prst="rect">
+                <a:avLst/>
+              </a:prstGeom>
+              <a:blipFill rotWithShape="0">
+                <a:blip r:embed="rId5"/>
+                <a:stretch>
+                  <a:fillRect/>
+                </a:stretch>
+              </a:blipFill>
+            </p:spPr>
+            <p:txBody>
+              <a:bodyPr/>
+              <a:lstStyle/>
+              <a:p>
+                <a:r>
+                  <a:rPr lang="en-US">
+                    <a:noFill/>
+                  </a:rPr>
+                  <a:t> </a:t>
+                </a:r>
+              </a:p>
+            </p:txBody>
+          </p:sp>
+        </mc:Fallback>
+      </mc:AlternateContent>
     </p:spTree>
     <p:extLst>
       <p:ext uri="{BB962C8B-B14F-4D97-AF65-F5344CB8AC3E}">

</xml_diff>